<commit_message>
a couple small tweaks
</commit_message>
<xml_diff>
--- a/08_package_structure/08_package_structure.pptx
+++ b/08_package_structure/08_package_structure.pptx
@@ -16033,7 +16033,7 @@
               <a:t>specified as a key with a string value if not using git hash e.g.: </a:t>
             </a:r>
             <a:r>
-              <a:rPr lang="en-US" sz="1800" dirty="0">
+              <a:rPr lang="en-US" sz="2000" dirty="0">
                 <a:latin typeface="Consolas" panose="020B0609020204030204" pitchFamily="49" charset="0"/>
                 <a:cs typeface="Consolas" panose="020B0609020204030204" pitchFamily="49" charset="0"/>
               </a:rPr>
@@ -16050,7 +16050,7 @@
               <a:t>If using git hash: </a:t>
             </a:r>
             <a:r>
-              <a:rPr lang="en-US" sz="1800" dirty="0">
+              <a:rPr lang="en-US" sz="2000" dirty="0">
                 <a:latin typeface="Consolas" panose="020B0609020204030204" pitchFamily="49" charset="0"/>
                 <a:cs typeface="Consolas" panose="020B0609020204030204" pitchFamily="49" charset="0"/>
               </a:rPr>
@@ -16064,21 +16064,21 @@
               <a:t>, also need to have a </a:t>
             </a:r>
             <a:r>
-              <a:rPr lang="en-US" sz="1800" dirty="0">
+              <a:rPr lang="en-US" sz="2000" dirty="0">
                 <a:latin typeface="Calibri" panose="020F0502020204030204" pitchFamily="34" charset="0"/>
                 <a:cs typeface="Calibri" panose="020F0502020204030204" pitchFamily="34" charset="0"/>
               </a:rPr>
               <a:t>[</a:t>
             </a:r>
             <a:r>
-              <a:rPr lang="en-US" sz="1800" dirty="0" err="1">
+              <a:rPr lang="en-US" sz="2000" dirty="0" err="1">
                 <a:latin typeface="Calibri" panose="020F0502020204030204" pitchFamily="34" charset="0"/>
                 <a:cs typeface="Calibri" panose="020F0502020204030204" pitchFamily="34" charset="0"/>
               </a:rPr>
               <a:t>tool.setuptools_scm</a:t>
             </a:r>
             <a:r>
-              <a:rPr lang="en-US" sz="1800" dirty="0">
+              <a:rPr lang="en-US" sz="2000" dirty="0">
                 <a:latin typeface="Calibri" panose="020F0502020204030204" pitchFamily="34" charset="0"/>
                 <a:cs typeface="Calibri" panose="020F0502020204030204" pitchFamily="34" charset="0"/>
               </a:rPr>
@@ -16633,6 +16633,7 @@
               <a:rPr lang="en-US" sz="2600" dirty="0"/>
               <a:t>Optional, but highly encouraged</a:t>
             </a:r>
+            <a:endParaRPr lang="en-US" sz="2200" dirty="0"/>
           </a:p>
           <a:p>
             <a:pPr marL="857250" lvl="1" indent="-457200">
@@ -16740,6 +16741,62 @@
               </a:rPr>
               <a:t>/issues"</a:t>
             </a:r>
+          </a:p>
+          <a:p>
+            <a:pPr marL="0" indent="0"/>
+            <a:endParaRPr lang="en-US" sz="1800" dirty="0">
+              <a:latin typeface="Consolas" panose="020B0609020204030204" pitchFamily="49" charset="0"/>
+              <a:cs typeface="Consolas" panose="020B0609020204030204" pitchFamily="49" charset="0"/>
+            </a:endParaRPr>
+          </a:p>
+          <a:p>
+            <a:pPr marL="0" indent="0"/>
+            <a:r>
+              <a:rPr lang="en-US" sz="1900" dirty="0">
+                <a:latin typeface="Calibri" panose="020F0502020204030204" pitchFamily="34" charset="0"/>
+                <a:cs typeface="Calibri" panose="020F0502020204030204" pitchFamily="34" charset="0"/>
+              </a:rPr>
+              <a:t>https://</a:t>
+            </a:r>
+            <a:r>
+              <a:rPr lang="en-US" sz="1900" dirty="0" err="1">
+                <a:latin typeface="Calibri" panose="020F0502020204030204" pitchFamily="34" charset="0"/>
+                <a:cs typeface="Calibri" panose="020F0502020204030204" pitchFamily="34" charset="0"/>
+              </a:rPr>
+              <a:t>packaging.python.org</a:t>
+            </a:r>
+            <a:r>
+              <a:rPr lang="en-US" sz="1900" dirty="0">
+                <a:latin typeface="Calibri" panose="020F0502020204030204" pitchFamily="34" charset="0"/>
+                <a:cs typeface="Calibri" panose="020F0502020204030204" pitchFamily="34" charset="0"/>
+              </a:rPr>
+              <a:t>/</a:t>
+            </a:r>
+            <a:r>
+              <a:rPr lang="en-US" sz="1900" dirty="0" err="1">
+                <a:latin typeface="Calibri" panose="020F0502020204030204" pitchFamily="34" charset="0"/>
+                <a:cs typeface="Calibri" panose="020F0502020204030204" pitchFamily="34" charset="0"/>
+              </a:rPr>
+              <a:t>en</a:t>
+            </a:r>
+            <a:r>
+              <a:rPr lang="en-US" sz="1900" dirty="0">
+                <a:latin typeface="Calibri" panose="020F0502020204030204" pitchFamily="34" charset="0"/>
+                <a:cs typeface="Calibri" panose="020F0502020204030204" pitchFamily="34" charset="0"/>
+              </a:rPr>
+              <a:t>/latest/specifications/well-known-project-</a:t>
+            </a:r>
+            <a:r>
+              <a:rPr lang="en-US" sz="1900" dirty="0" err="1">
+                <a:latin typeface="Calibri" panose="020F0502020204030204" pitchFamily="34" charset="0"/>
+                <a:cs typeface="Calibri" panose="020F0502020204030204" pitchFamily="34" charset="0"/>
+              </a:rPr>
+              <a:t>urls</a:t>
+            </a:r>
+            <a:endParaRPr lang="en-US" sz="1900" dirty="0">
+              <a:latin typeface="Calibri" panose="020F0502020204030204" pitchFamily="34" charset="0"/>
+              <a:cs typeface="Calibri" panose="020F0502020204030204" pitchFamily="34" charset="0"/>
+            </a:endParaRPr>
           </a:p>
         </p:txBody>
       </p:sp>

</xml_diff>